<commit_message>
Updated diagrams shown in developer guide
</commit_message>
<xml_diff>
--- a/doc/Diagrams.pptx
+++ b/doc/Diagrams.pptx
@@ -307,7 +307,7 @@
           <a:p>
             <a:fld id="{78C97017-6FC3-485B-9764-EAC9E56C1D49}" type="datetimeFigureOut">
               <a:rPr lang="en-US" smtClean="0"/>
-              <a:t>8/31/2017</a:t>
+              <a:t>2/15/2018</a:t>
             </a:fld>
             <a:endParaRPr lang="en-US"/>
           </a:p>
@@ -477,7 +477,7 @@
           <a:p>
             <a:fld id="{78C97017-6FC3-485B-9764-EAC9E56C1D49}" type="datetimeFigureOut">
               <a:rPr lang="en-US" smtClean="0"/>
-              <a:t>8/31/2017</a:t>
+              <a:t>2/15/2018</a:t>
             </a:fld>
             <a:endParaRPr lang="en-US"/>
           </a:p>
@@ -657,7 +657,7 @@
           <a:p>
             <a:fld id="{78C97017-6FC3-485B-9764-EAC9E56C1D49}" type="datetimeFigureOut">
               <a:rPr lang="en-US" smtClean="0"/>
-              <a:t>8/31/2017</a:t>
+              <a:t>2/15/2018</a:t>
             </a:fld>
             <a:endParaRPr lang="en-US"/>
           </a:p>
@@ -827,7 +827,7 @@
           <a:p>
             <a:fld id="{78C97017-6FC3-485B-9764-EAC9E56C1D49}" type="datetimeFigureOut">
               <a:rPr lang="en-US" smtClean="0"/>
-              <a:t>8/31/2017</a:t>
+              <a:t>2/15/2018</a:t>
             </a:fld>
             <a:endParaRPr lang="en-US"/>
           </a:p>
@@ -1073,7 +1073,7 @@
           <a:p>
             <a:fld id="{78C97017-6FC3-485B-9764-EAC9E56C1D49}" type="datetimeFigureOut">
               <a:rPr lang="en-US" smtClean="0"/>
-              <a:t>8/31/2017</a:t>
+              <a:t>2/15/2018</a:t>
             </a:fld>
             <a:endParaRPr lang="en-US"/>
           </a:p>
@@ -1361,7 +1361,7 @@
           <a:p>
             <a:fld id="{78C97017-6FC3-485B-9764-EAC9E56C1D49}" type="datetimeFigureOut">
               <a:rPr lang="en-US" smtClean="0"/>
-              <a:t>8/31/2017</a:t>
+              <a:t>2/15/2018</a:t>
             </a:fld>
             <a:endParaRPr lang="en-US"/>
           </a:p>
@@ -1783,7 +1783,7 @@
           <a:p>
             <a:fld id="{78C97017-6FC3-485B-9764-EAC9E56C1D49}" type="datetimeFigureOut">
               <a:rPr lang="en-US" smtClean="0"/>
-              <a:t>8/31/2017</a:t>
+              <a:t>2/15/2018</a:t>
             </a:fld>
             <a:endParaRPr lang="en-US"/>
           </a:p>
@@ -1901,7 +1901,7 @@
           <a:p>
             <a:fld id="{78C97017-6FC3-485B-9764-EAC9E56C1D49}" type="datetimeFigureOut">
               <a:rPr lang="en-US" smtClean="0"/>
-              <a:t>8/31/2017</a:t>
+              <a:t>2/15/2018</a:t>
             </a:fld>
             <a:endParaRPr lang="en-US"/>
           </a:p>
@@ -1996,7 +1996,7 @@
           <a:p>
             <a:fld id="{78C97017-6FC3-485B-9764-EAC9E56C1D49}" type="datetimeFigureOut">
               <a:rPr lang="en-US" smtClean="0"/>
-              <a:t>8/31/2017</a:t>
+              <a:t>2/15/2018</a:t>
             </a:fld>
             <a:endParaRPr lang="en-US"/>
           </a:p>
@@ -2273,7 +2273,7 @@
           <a:p>
             <a:fld id="{78C97017-6FC3-485B-9764-EAC9E56C1D49}" type="datetimeFigureOut">
               <a:rPr lang="en-US" smtClean="0"/>
-              <a:t>8/31/2017</a:t>
+              <a:t>2/15/2018</a:t>
             </a:fld>
             <a:endParaRPr lang="en-US"/>
           </a:p>
@@ -2526,7 +2526,7 @@
           <a:p>
             <a:fld id="{78C97017-6FC3-485B-9764-EAC9E56C1D49}" type="datetimeFigureOut">
               <a:rPr lang="en-US" smtClean="0"/>
-              <a:t>8/31/2017</a:t>
+              <a:t>2/15/2018</a:t>
             </a:fld>
             <a:endParaRPr lang="en-US"/>
           </a:p>
@@ -2739,7 +2739,7 @@
           <a:p>
             <a:fld id="{78C97017-6FC3-485B-9764-EAC9E56C1D49}" type="datetimeFigureOut">
               <a:rPr lang="en-US" smtClean="0"/>
-              <a:t>8/31/2017</a:t>
+              <a:t>2/15/2018</a:t>
             </a:fld>
             <a:endParaRPr lang="en-US"/>
           </a:p>
@@ -3539,7 +3539,7 @@
         </p:nvSpPr>
         <p:spPr>
           <a:xfrm>
-            <a:off x="6781800" y="4036277"/>
+            <a:off x="6783704" y="3883877"/>
             <a:ext cx="929296" cy="346760"/>
           </a:xfrm>
           <a:prstGeom prst="rect">
@@ -3583,7 +3583,7 @@
         </p:nvSpPr>
         <p:spPr>
           <a:xfrm>
-            <a:off x="6796454" y="4495800"/>
+            <a:off x="6798358" y="4343400"/>
             <a:ext cx="929296" cy="346760"/>
           </a:xfrm>
           <a:prstGeom prst="rect">
@@ -3627,7 +3627,7 @@
         </p:nvSpPr>
         <p:spPr>
           <a:xfrm>
-            <a:off x="6796454" y="4953000"/>
+            <a:off x="6798358" y="4800600"/>
             <a:ext cx="929296" cy="346760"/>
           </a:xfrm>
           <a:prstGeom prst="rect">
@@ -3956,8 +3956,8 @@
         </p:nvCxnSpPr>
         <p:spPr>
           <a:xfrm flipV="1">
-            <a:off x="6384802" y="4209657"/>
-            <a:ext cx="396998" cy="312434"/>
+            <a:off x="6384802" y="4057257"/>
+            <a:ext cx="398902" cy="464834"/>
           </a:xfrm>
           <a:prstGeom prst="bentConnector3">
             <a:avLst>
@@ -3995,9 +3995,9 @@
           <p:nvPr/>
         </p:nvCxnSpPr>
         <p:spPr>
-          <a:xfrm>
-            <a:off x="6384802" y="4522091"/>
-            <a:ext cx="411652" cy="147089"/>
+          <a:xfrm flipV="1">
+            <a:off x="6384802" y="4516780"/>
+            <a:ext cx="413556" cy="5311"/>
           </a:xfrm>
           <a:prstGeom prst="bentConnector3">
             <a:avLst>
@@ -4037,7 +4037,7 @@
         <p:spPr>
           <a:xfrm>
             <a:off x="6384802" y="4522091"/>
-            <a:ext cx="411652" cy="604289"/>
+            <a:ext cx="413556" cy="451889"/>
           </a:xfrm>
           <a:prstGeom prst="bentConnector3">
             <a:avLst>
@@ -5240,7 +5240,7 @@
         </p:nvSpPr>
         <p:spPr>
           <a:xfrm>
-            <a:off x="6781800" y="3539440"/>
+            <a:off x="6783704" y="3387040"/>
             <a:ext cx="929296" cy="346760"/>
           </a:xfrm>
           <a:prstGeom prst="rect">
@@ -5287,8 +5287,8 @@
         </p:nvCxnSpPr>
         <p:spPr>
           <a:xfrm flipV="1">
-            <a:off x="6384802" y="3712820"/>
-            <a:ext cx="396998" cy="809271"/>
+            <a:off x="6384802" y="3560420"/>
+            <a:ext cx="398902" cy="961671"/>
           </a:xfrm>
           <a:prstGeom prst="bentConnector3">
             <a:avLst>
@@ -5764,6 +5764,87 @@
           </a:fillRef>
           <a:effectRef idx="1">
             <a:schemeClr val="accent2"/>
+          </a:effectRef>
+          <a:fontRef idx="minor">
+            <a:schemeClr val="dk1"/>
+          </a:fontRef>
+        </p:style>
+      </p:cxnSp>
+      <p:sp>
+        <p:nvSpPr>
+          <p:cNvPr id="66" name="Rectangle 65"/>
+          <p:cNvSpPr/>
+          <p:nvPr/>
+        </p:nvSpPr>
+        <p:spPr>
+          <a:xfrm>
+            <a:off x="6783704" y="5257800"/>
+            <a:ext cx="929296" cy="346760"/>
+          </a:xfrm>
+          <a:prstGeom prst="rect">
+            <a:avLst/>
+          </a:prstGeom>
+          <a:ln w="19050"/>
+          <a:effectLst/>
+        </p:spPr>
+        <p:style>
+          <a:lnRef idx="1">
+            <a:schemeClr val="accent4"/>
+          </a:lnRef>
+          <a:fillRef idx="2">
+            <a:schemeClr val="accent4"/>
+          </a:fillRef>
+          <a:effectRef idx="1">
+            <a:schemeClr val="accent4"/>
+          </a:effectRef>
+          <a:fontRef idx="minor">
+            <a:schemeClr val="dk1"/>
+          </a:fontRef>
+        </p:style>
+        <p:txBody>
+          <a:bodyPr rtlCol="0" anchor="ctr"/>
+          <a:lstStyle/>
+          <a:p>
+            <a:pPr algn="ctr"/>
+            <a:r>
+              <a:rPr lang="en-US" sz="1050" dirty="0" smtClean="0"/>
+              <a:t>Birthday</a:t>
+            </a:r>
+            <a:endParaRPr lang="en-SG" sz="1050" dirty="0"/>
+          </a:p>
+        </p:txBody>
+      </p:sp>
+      <p:cxnSp>
+        <p:nvCxnSpPr>
+          <p:cNvPr id="69" name="Elbow Connector 68"/>
+          <p:cNvCxnSpPr>
+            <a:endCxn id="66" idx="1"/>
+          </p:cNvCxnSpPr>
+          <p:nvPr/>
+        </p:nvCxnSpPr>
+        <p:spPr>
+          <a:xfrm rot="16200000" flipH="1">
+            <a:off x="6153712" y="4801187"/>
+            <a:ext cx="1061487" cy="198497"/>
+          </a:xfrm>
+          <a:prstGeom prst="bentConnector2">
+            <a:avLst/>
+          </a:prstGeom>
+          <a:ln w="19050">
+            <a:headEnd type="none" w="med" len="med"/>
+            <a:tailEnd type="arrow" w="med" len="med"/>
+          </a:ln>
+          <a:effectLst/>
+        </p:spPr>
+        <p:style>
+          <a:lnRef idx="1">
+            <a:schemeClr val="accent6"/>
+          </a:lnRef>
+          <a:fillRef idx="2">
+            <a:schemeClr val="accent6"/>
+          </a:fillRef>
+          <a:effectRef idx="1">
+            <a:schemeClr val="accent6"/>
           </a:effectRef>
           <a:fontRef idx="minor">
             <a:schemeClr val="dk1"/>
@@ -6596,7 +6677,7 @@
         </p:nvSpPr>
         <p:spPr>
           <a:xfrm>
-            <a:off x="4481146" y="4467827"/>
+            <a:off x="4519866" y="4250707"/>
             <a:ext cx="929296" cy="346760"/>
           </a:xfrm>
           <a:prstGeom prst="rect">
@@ -6640,7 +6721,7 @@
         </p:nvSpPr>
         <p:spPr>
           <a:xfrm>
-            <a:off x="4481146" y="4862814"/>
+            <a:off x="4519866" y="4645694"/>
             <a:ext cx="929296" cy="346760"/>
           </a:xfrm>
           <a:prstGeom prst="rect">
@@ -6684,7 +6765,7 @@
         </p:nvSpPr>
         <p:spPr>
           <a:xfrm>
-            <a:off x="4481146" y="5257800"/>
+            <a:off x="4519866" y="5040680"/>
             <a:ext cx="929296" cy="346760"/>
           </a:xfrm>
           <a:prstGeom prst="rect">
@@ -6771,8 +6852,8 @@
         </p:nvCxnSpPr>
         <p:spPr>
           <a:xfrm rot="10800000" flipV="1">
-            <a:off x="5410443" y="4814586"/>
-            <a:ext cx="533159" cy="221607"/>
+            <a:off x="5449163" y="4814586"/>
+            <a:ext cx="494439" cy="4487"/>
           </a:xfrm>
           <a:prstGeom prst="bentConnector3">
             <a:avLst>
@@ -6810,8 +6891,8 @@
         </p:nvCxnSpPr>
         <p:spPr>
           <a:xfrm rot="10800000">
-            <a:off x="5410443" y="4641207"/>
-            <a:ext cx="533159" cy="173380"/>
+            <a:off x="5449163" y="4424087"/>
+            <a:ext cx="494439" cy="390500"/>
           </a:xfrm>
           <a:prstGeom prst="bentConnector3">
             <a:avLst>
@@ -6849,8 +6930,8 @@
         </p:nvCxnSpPr>
         <p:spPr>
           <a:xfrm rot="10800000" flipV="1">
-            <a:off x="5410443" y="4814586"/>
-            <a:ext cx="533159" cy="616593"/>
+            <a:off x="5449163" y="4814586"/>
+            <a:ext cx="494439" cy="399473"/>
           </a:xfrm>
           <a:prstGeom prst="bentConnector3">
             <a:avLst>
@@ -6885,7 +6966,7 @@
         </p:nvSpPr>
         <p:spPr>
           <a:xfrm>
-            <a:off x="4481146" y="4072840"/>
+            <a:off x="4519866" y="3855720"/>
             <a:ext cx="929296" cy="346760"/>
           </a:xfrm>
           <a:prstGeom prst="rect">
@@ -6932,8 +7013,8 @@
         </p:nvCxnSpPr>
         <p:spPr>
           <a:xfrm rot="10800000">
-            <a:off x="5410443" y="4246221"/>
-            <a:ext cx="533159" cy="568367"/>
+            <a:off x="5449163" y="4029101"/>
+            <a:ext cx="494439" cy="785487"/>
           </a:xfrm>
           <a:prstGeom prst="bentConnector3">
             <a:avLst>
@@ -7807,6 +7888,89 @@
           </a:p>
         </p:txBody>
       </p:sp>
+      <p:sp>
+        <p:nvSpPr>
+          <p:cNvPr id="56" name="Rectangle 21"/>
+          <p:cNvSpPr/>
+          <p:nvPr/>
+        </p:nvSpPr>
+        <p:spPr>
+          <a:xfrm>
+            <a:off x="4519866" y="5435666"/>
+            <a:ext cx="929296" cy="346760"/>
+          </a:xfrm>
+          <a:prstGeom prst="rect">
+            <a:avLst/>
+          </a:prstGeom>
+          <a:ln w="19050"/>
+          <a:effectLst/>
+        </p:spPr>
+        <p:style>
+          <a:lnRef idx="1">
+            <a:schemeClr val="accent4"/>
+          </a:lnRef>
+          <a:fillRef idx="2">
+            <a:schemeClr val="accent4"/>
+          </a:fillRef>
+          <a:effectRef idx="1">
+            <a:schemeClr val="accent4"/>
+          </a:effectRef>
+          <a:fontRef idx="minor">
+            <a:schemeClr val="dk1"/>
+          </a:fontRef>
+        </p:style>
+        <p:txBody>
+          <a:bodyPr rtlCol="0" anchor="ctr"/>
+          <a:lstStyle/>
+          <a:p>
+            <a:pPr algn="ctr"/>
+            <a:r>
+              <a:rPr lang="en-US" sz="1050" dirty="0" smtClean="0"/>
+              <a:t>Birthday</a:t>
+            </a:r>
+            <a:endParaRPr lang="en-SG" sz="1050" dirty="0"/>
+          </a:p>
+        </p:txBody>
+      </p:sp>
+      <p:cxnSp>
+        <p:nvCxnSpPr>
+          <p:cNvPr id="58" name="Elbow Connector 29"/>
+          <p:cNvCxnSpPr>
+            <a:stCxn id="26" idx="3"/>
+            <a:endCxn id="56" idx="3"/>
+          </p:cNvCxnSpPr>
+          <p:nvPr/>
+        </p:nvCxnSpPr>
+        <p:spPr>
+          <a:xfrm rot="10800000" flipV="1">
+            <a:off x="5449163" y="4814586"/>
+            <a:ext cx="494439" cy="794459"/>
+          </a:xfrm>
+          <a:prstGeom prst="bentConnector3">
+            <a:avLst>
+              <a:gd name="adj1" fmla="val 50000"/>
+            </a:avLst>
+          </a:prstGeom>
+          <a:ln w="19050">
+            <a:prstDash val="dash"/>
+          </a:ln>
+          <a:effectLst/>
+        </p:spPr>
+        <p:style>
+          <a:lnRef idx="1">
+            <a:schemeClr val="accent4"/>
+          </a:lnRef>
+          <a:fillRef idx="2">
+            <a:schemeClr val="accent4"/>
+          </a:fillRef>
+          <a:effectRef idx="1">
+            <a:schemeClr val="accent4"/>
+          </a:effectRef>
+          <a:fontRef idx="minor">
+            <a:schemeClr val="dk1"/>
+          </a:fontRef>
+        </p:style>
+      </p:cxnSp>
     </p:spTree>
     <p:extLst>
       <p:ext uri="{BB962C8B-B14F-4D97-AF65-F5344CB8AC3E}">

</xml_diff>